<commit_message>
Update presentation for Andrew
</commit_message>
<xml_diff>
--- a/2023/Диплом/Андрей Козин/Презентация Андрей.pptx
+++ b/2023/Диплом/Андрей Козин/Презентация Андрей.pptx
@@ -120,6 +120,1027 @@
 </p:presentation>
 </file>
 
+<file path=ppt/charts/chart1.xml><?xml version="1.0" encoding="utf-8"?>
+<c:chartSpace xmlns:c="http://schemas.openxmlformats.org/drawingml/2006/chart" xmlns:a="http://schemas.openxmlformats.org/drawingml/2006/main" xmlns:r="http://schemas.openxmlformats.org/officeDocument/2006/relationships" xmlns:c16r2="http://schemas.microsoft.com/office/drawing/2015/06/chart">
+  <c:date1904 val="0"/>
+  <c:lang val="ru-RU"/>
+  <c:roundedCorners val="0"/>
+  <mc:AlternateContent xmlns:mc="http://schemas.openxmlformats.org/markup-compatibility/2006">
+    <mc:Choice xmlns:c14="http://schemas.microsoft.com/office/drawing/2007/8/2/chart" Requires="c14">
+      <c14:style val="102"/>
+    </mc:Choice>
+    <mc:Fallback>
+      <c:style val="2"/>
+    </mc:Fallback>
+  </mc:AlternateContent>
+  <c:chart>
+    <c:title>
+      <c:tx>
+        <c:rich>
+          <a:bodyPr rot="0" spcFirstLastPara="1" vertOverflow="ellipsis" vert="horz" wrap="square" anchor="ctr" anchorCtr="1"/>
+          <a:lstStyle/>
+          <a:p>
+            <a:pPr>
+              <a:defRPr sz="2200" b="1" i="0" u="none" strike="noStrike" kern="1200" baseline="0">
+                <a:solidFill>
+                  <a:schemeClr val="dk1">
+                    <a:lumMod val="75000"/>
+                    <a:lumOff val="25000"/>
+                  </a:schemeClr>
+                </a:solidFill>
+                <a:latin typeface="+mn-lt"/>
+                <a:ea typeface="+mn-ea"/>
+                <a:cs typeface="+mn-cs"/>
+              </a:defRPr>
+            </a:pPr>
+            <a:r>
+              <a:rPr lang="ru-RU" sz="2200" b="1" i="0" u="none" strike="noStrike" baseline="0" dirty="0" smtClean="0">
+                <a:effectLst/>
+              </a:rPr>
+              <a:t>Финансовых результатов деятельности предприятия</a:t>
+            </a:r>
+            <a:endParaRPr lang="ru-RU" dirty="0"/>
+          </a:p>
+        </c:rich>
+      </c:tx>
+      <c:layout/>
+      <c:overlay val="0"/>
+      <c:spPr>
+        <a:noFill/>
+        <a:ln>
+          <a:noFill/>
+        </a:ln>
+        <a:effectLst/>
+      </c:spPr>
+      <c:txPr>
+        <a:bodyPr rot="0" spcFirstLastPara="1" vertOverflow="ellipsis" vert="horz" wrap="square" anchor="ctr" anchorCtr="1"/>
+        <a:lstStyle/>
+        <a:p>
+          <a:pPr>
+            <a:defRPr sz="2200" b="1" i="0" u="none" strike="noStrike" kern="1200" baseline="0">
+              <a:solidFill>
+                <a:schemeClr val="dk1">
+                  <a:lumMod val="75000"/>
+                  <a:lumOff val="25000"/>
+                </a:schemeClr>
+              </a:solidFill>
+              <a:latin typeface="+mn-lt"/>
+              <a:ea typeface="+mn-ea"/>
+              <a:cs typeface="+mn-cs"/>
+            </a:defRPr>
+          </a:pPr>
+          <a:endParaRPr lang="ru-RU"/>
+        </a:p>
+      </c:txPr>
+    </c:title>
+    <c:autoTitleDeleted val="0"/>
+    <c:plotArea>
+      <c:layout/>
+      <c:pieChart>
+        <c:varyColors val="1"/>
+        <c:ser>
+          <c:idx val="0"/>
+          <c:order val="0"/>
+          <c:tx>
+            <c:strRef>
+              <c:f>Лист1!$B$1</c:f>
+              <c:strCache>
+                <c:ptCount val="1"/>
+                <c:pt idx="0">
+                  <c:v>Продажи</c:v>
+                </c:pt>
+              </c:strCache>
+            </c:strRef>
+          </c:tx>
+          <c:dPt>
+            <c:idx val="0"/>
+            <c:bubble3D val="0"/>
+            <c:spPr>
+              <a:solidFill>
+                <a:schemeClr val="accent2"/>
+              </a:solidFill>
+              <a:ln>
+                <a:noFill/>
+              </a:ln>
+              <a:effectLst>
+                <a:outerShdw blurRad="254000" sx="102000" sy="102000" algn="ctr" rotWithShape="0">
+                  <a:prstClr val="black">
+                    <a:alpha val="20000"/>
+                  </a:prstClr>
+                </a:outerShdw>
+              </a:effectLst>
+            </c:spPr>
+          </c:dPt>
+          <c:dPt>
+            <c:idx val="1"/>
+            <c:bubble3D val="0"/>
+            <c:spPr>
+              <a:solidFill>
+                <a:schemeClr val="accent4"/>
+              </a:solidFill>
+              <a:ln>
+                <a:noFill/>
+              </a:ln>
+              <a:effectLst>
+                <a:outerShdw blurRad="254000" sx="102000" sy="102000" algn="ctr" rotWithShape="0">
+                  <a:prstClr val="black">
+                    <a:alpha val="20000"/>
+                  </a:prstClr>
+                </a:outerShdw>
+              </a:effectLst>
+            </c:spPr>
+          </c:dPt>
+          <c:dPt>
+            <c:idx val="2"/>
+            <c:bubble3D val="0"/>
+            <c:spPr>
+              <a:solidFill>
+                <a:schemeClr val="accent6"/>
+              </a:solidFill>
+              <a:ln>
+                <a:noFill/>
+              </a:ln>
+              <a:effectLst>
+                <a:outerShdw blurRad="254000" sx="102000" sy="102000" algn="ctr" rotWithShape="0">
+                  <a:prstClr val="black">
+                    <a:alpha val="20000"/>
+                  </a:prstClr>
+                </a:outerShdw>
+              </a:effectLst>
+            </c:spPr>
+          </c:dPt>
+          <c:dLbls>
+            <c:spPr>
+              <a:pattFill prst="pct75">
+                <a:fgClr>
+                  <a:schemeClr val="dk1">
+                    <a:lumMod val="75000"/>
+                    <a:lumOff val="25000"/>
+                  </a:schemeClr>
+                </a:fgClr>
+                <a:bgClr>
+                  <a:schemeClr val="dk1">
+                    <a:lumMod val="65000"/>
+                    <a:lumOff val="35000"/>
+                  </a:schemeClr>
+                </a:bgClr>
+              </a:pattFill>
+              <a:ln>
+                <a:noFill/>
+              </a:ln>
+              <a:effectLst>
+                <a:outerShdw blurRad="50800" dist="38100" dir="2700000" algn="tl" rotWithShape="0">
+                  <a:prstClr val="black">
+                    <a:alpha val="40000"/>
+                  </a:prstClr>
+                </a:outerShdw>
+              </a:effectLst>
+            </c:spPr>
+            <c:txPr>
+              <a:bodyPr rot="0" spcFirstLastPara="1" vertOverflow="ellipsis" vert="horz" wrap="square" lIns="38100" tIns="19050" rIns="38100" bIns="19050" anchor="ctr" anchorCtr="1">
+                <a:spAutoFit/>
+              </a:bodyPr>
+              <a:lstStyle/>
+              <a:p>
+                <a:pPr>
+                  <a:defRPr sz="1330" b="1" i="0" u="none" strike="noStrike" kern="1200" baseline="0">
+                    <a:solidFill>
+                      <a:schemeClr val="lt1"/>
+                    </a:solidFill>
+                    <a:latin typeface="+mn-lt"/>
+                    <a:ea typeface="+mn-ea"/>
+                    <a:cs typeface="+mn-cs"/>
+                  </a:defRPr>
+                </a:pPr>
+                <a:endParaRPr lang="ru-RU"/>
+              </a:p>
+            </c:txPr>
+            <c:dLblPos val="ctr"/>
+            <c:showLegendKey val="0"/>
+            <c:showVal val="0"/>
+            <c:showCatName val="0"/>
+            <c:showSerName val="0"/>
+            <c:showPercent val="1"/>
+            <c:showBubbleSize val="0"/>
+            <c:showLeaderLines val="1"/>
+            <c:leaderLines>
+              <c:spPr>
+                <a:ln w="9525">
+                  <a:solidFill>
+                    <a:schemeClr val="dk1">
+                      <a:lumMod val="50000"/>
+                      <a:lumOff val="50000"/>
+                    </a:schemeClr>
+                  </a:solidFill>
+                </a:ln>
+                <a:effectLst/>
+              </c:spPr>
+            </c:leaderLines>
+            <c:extLst>
+              <c:ext xmlns:c15="http://schemas.microsoft.com/office/drawing/2012/chart" uri="{CE6537A1-D6FC-4f65-9D91-7224C49458BB}">
+                <c15:layout/>
+              </c:ext>
+            </c:extLst>
+          </c:dLbls>
+          <c:cat>
+            <c:strRef>
+              <c:f>Лист1!$A$2:$A$5</c:f>
+              <c:strCache>
+                <c:ptCount val="4"/>
+                <c:pt idx="0">
+                  <c:v>Товарная продукция</c:v>
+                </c:pt>
+                <c:pt idx="1">
+                  <c:v>Валовая продукция</c:v>
+                </c:pt>
+                <c:pt idx="2">
+                  <c:v>Чистая продукция</c:v>
+                </c:pt>
+                <c:pt idx="3">
+                  <c:v>Реализованная продукция</c:v>
+                </c:pt>
+              </c:strCache>
+            </c:strRef>
+          </c:cat>
+          <c:val>
+            <c:numRef>
+              <c:f>Лист1!$B$2:$B$4</c:f>
+              <c:numCache>
+                <c:formatCode>General</c:formatCode>
+                <c:ptCount val="3"/>
+                <c:pt idx="0">
+                  <c:v>880983.5</c:v>
+                </c:pt>
+                <c:pt idx="1">
+                  <c:v>1508331.4</c:v>
+                </c:pt>
+                <c:pt idx="2">
+                  <c:v>859983.5</c:v>
+                </c:pt>
+              </c:numCache>
+            </c:numRef>
+          </c:val>
+          <c:extLst>
+            <c:ext xmlns:c16="http://schemas.microsoft.com/office/drawing/2014/chart" uri="{C3380CC4-5D6E-409C-BE32-E72D297353CC}">
+              <c16:uniqueId val="{00000000-A897-4114-A721-B9D0A89A34D4}"/>
+            </c:ext>
+          </c:extLst>
+        </c:ser>
+        <c:dLbls>
+          <c:dLblPos val="ctr"/>
+          <c:showLegendKey val="0"/>
+          <c:showVal val="0"/>
+          <c:showCatName val="0"/>
+          <c:showSerName val="0"/>
+          <c:showPercent val="1"/>
+          <c:showBubbleSize val="0"/>
+          <c:showLeaderLines val="1"/>
+        </c:dLbls>
+        <c:firstSliceAng val="0"/>
+      </c:pieChart>
+      <c:spPr>
+        <a:noFill/>
+        <a:ln>
+          <a:noFill/>
+        </a:ln>
+        <a:effectLst/>
+      </c:spPr>
+    </c:plotArea>
+    <c:legend>
+      <c:legendPos val="r"/>
+      <c:layout>
+        <c:manualLayout>
+          <c:xMode val="edge"/>
+          <c:yMode val="edge"/>
+          <c:x val="0.663542915900594"/>
+          <c:y val="0.15133985197444469"/>
+          <c:w val="0.32510151277222354"/>
+          <c:h val="0.69119101607765165"/>
+        </c:manualLayout>
+      </c:layout>
+      <c:overlay val="0"/>
+      <c:spPr>
+        <a:solidFill>
+          <a:schemeClr val="lt1">
+            <a:lumMod val="95000"/>
+            <a:alpha val="39000"/>
+          </a:schemeClr>
+        </a:solidFill>
+        <a:ln>
+          <a:noFill/>
+        </a:ln>
+        <a:effectLst/>
+      </c:spPr>
+      <c:txPr>
+        <a:bodyPr rot="0" spcFirstLastPara="1" vertOverflow="ellipsis" vert="horz" wrap="square" anchor="ctr" anchorCtr="1"/>
+        <a:lstStyle/>
+        <a:p>
+          <a:pPr>
+            <a:defRPr sz="2000" b="0" i="0" u="none" strike="noStrike" kern="1200" baseline="0">
+              <a:solidFill>
+                <a:schemeClr val="dk1">
+                  <a:lumMod val="75000"/>
+                  <a:lumOff val="25000"/>
+                </a:schemeClr>
+              </a:solidFill>
+              <a:latin typeface="+mn-lt"/>
+              <a:ea typeface="+mn-ea"/>
+              <a:cs typeface="+mn-cs"/>
+            </a:defRPr>
+          </a:pPr>
+          <a:endParaRPr lang="ru-RU"/>
+        </a:p>
+      </c:txPr>
+    </c:legend>
+    <c:plotVisOnly val="1"/>
+    <c:dispBlanksAs val="gap"/>
+    <c:showDLblsOverMax val="0"/>
+  </c:chart>
+  <c:spPr>
+    <a:gradFill flip="none" rotWithShape="1">
+      <a:gsLst>
+        <a:gs pos="0">
+          <a:schemeClr val="lt1"/>
+        </a:gs>
+        <a:gs pos="39000">
+          <a:schemeClr val="lt1"/>
+        </a:gs>
+        <a:gs pos="100000">
+          <a:schemeClr val="lt1">
+            <a:lumMod val="75000"/>
+          </a:schemeClr>
+        </a:gs>
+      </a:gsLst>
+      <a:path path="circle">
+        <a:fillToRect l="50000" t="-80000" r="50000" b="180000"/>
+      </a:path>
+      <a:tileRect/>
+    </a:gradFill>
+    <a:ln w="9525" cap="flat" cmpd="sng" algn="ctr">
+      <a:solidFill>
+        <a:schemeClr val="dk1">
+          <a:lumMod val="25000"/>
+          <a:lumOff val="75000"/>
+        </a:schemeClr>
+      </a:solidFill>
+      <a:round/>
+    </a:ln>
+    <a:effectLst/>
+  </c:spPr>
+  <c:txPr>
+    <a:bodyPr/>
+    <a:lstStyle/>
+    <a:p>
+      <a:pPr>
+        <a:defRPr/>
+      </a:pPr>
+      <a:endParaRPr lang="ru-RU"/>
+    </a:p>
+  </c:txPr>
+  <c:externalData r:id="rId3">
+    <c:autoUpdate val="0"/>
+  </c:externalData>
+</c:chartSpace>
+</file>
+
+<file path=ppt/charts/colors1.xml><?xml version="1.0" encoding="utf-8"?>
+<cs:colorStyle xmlns:cs="http://schemas.microsoft.com/office/drawing/2012/chartStyle" xmlns:a="http://schemas.openxmlformats.org/drawingml/2006/main" meth="cycle" id="12">
+  <a:schemeClr val="accent2"/>
+  <a:schemeClr val="accent4"/>
+  <a:schemeClr val="accent6"/>
+  <cs:variation/>
+  <cs:variation>
+    <a:lumMod val="60000"/>
+  </cs:variation>
+  <cs:variation>
+    <a:lumMod val="80000"/>
+    <a:lumOff val="20000"/>
+  </cs:variation>
+  <cs:variation>
+    <a:lumMod val="80000"/>
+  </cs:variation>
+  <cs:variation>
+    <a:lumMod val="60000"/>
+    <a:lumOff val="40000"/>
+  </cs:variation>
+  <cs:variation>
+    <a:lumMod val="50000"/>
+  </cs:variation>
+  <cs:variation>
+    <a:lumMod val="70000"/>
+    <a:lumOff val="30000"/>
+  </cs:variation>
+  <cs:variation>
+    <a:lumMod val="70000"/>
+  </cs:variation>
+  <cs:variation>
+    <a:lumMod val="50000"/>
+    <a:lumOff val="50000"/>
+  </cs:variation>
+</cs:colorStyle>
+</file>
+
+<file path=ppt/charts/style1.xml><?xml version="1.0" encoding="utf-8"?>
+<cs:chartStyle xmlns:cs="http://schemas.microsoft.com/office/drawing/2012/chartStyle" xmlns:a="http://schemas.openxmlformats.org/drawingml/2006/main" id="253">
+  <cs:axisTitle>
+    <cs:lnRef idx="0"/>
+    <cs:fillRef idx="0"/>
+    <cs:effectRef idx="0"/>
+    <cs:fontRef idx="minor">
+      <a:schemeClr val="dk1">
+        <a:lumMod val="75000"/>
+        <a:lumOff val="25000"/>
+      </a:schemeClr>
+    </cs:fontRef>
+    <cs:defRPr sz="1197" b="1" kern="1200"/>
+  </cs:axisTitle>
+  <cs:categoryAxis>
+    <cs:lnRef idx="0"/>
+    <cs:fillRef idx="0"/>
+    <cs:effectRef idx="0"/>
+    <cs:fontRef idx="minor">
+      <a:schemeClr val="dk1">
+        <a:lumMod val="75000"/>
+        <a:lumOff val="25000"/>
+      </a:schemeClr>
+    </cs:fontRef>
+    <cs:spPr>
+      <a:ln w="19050" cap="flat" cmpd="sng" algn="ctr">
+        <a:solidFill>
+          <a:schemeClr val="dk1">
+            <a:lumMod val="75000"/>
+            <a:lumOff val="25000"/>
+          </a:schemeClr>
+        </a:solidFill>
+        <a:round/>
+      </a:ln>
+    </cs:spPr>
+    <cs:defRPr sz="1197" kern="1200" cap="all" baseline="0"/>
+  </cs:categoryAxis>
+  <cs:chartArea>
+    <cs:lnRef idx="0"/>
+    <cs:fillRef idx="0"/>
+    <cs:effectRef idx="0"/>
+    <cs:fontRef idx="minor">
+      <a:schemeClr val="dk1"/>
+    </cs:fontRef>
+    <cs:spPr>
+      <a:gradFill flip="none" rotWithShape="1">
+        <a:gsLst>
+          <a:gs pos="0">
+            <a:schemeClr val="lt1"/>
+          </a:gs>
+          <a:gs pos="39000">
+            <a:schemeClr val="lt1"/>
+          </a:gs>
+          <a:gs pos="100000">
+            <a:schemeClr val="lt1">
+              <a:lumMod val="75000"/>
+            </a:schemeClr>
+          </a:gs>
+        </a:gsLst>
+        <a:path path="circle">
+          <a:fillToRect l="50000" t="-80000" r="50000" b="180000"/>
+        </a:path>
+        <a:tileRect/>
+      </a:gradFill>
+      <a:ln w="9525" cap="flat" cmpd="sng" algn="ctr">
+        <a:solidFill>
+          <a:schemeClr val="dk1">
+            <a:lumMod val="25000"/>
+            <a:lumOff val="75000"/>
+          </a:schemeClr>
+        </a:solidFill>
+        <a:round/>
+      </a:ln>
+    </cs:spPr>
+    <cs:defRPr sz="1197" kern="1200"/>
+  </cs:chartArea>
+  <cs:dataLabel>
+    <cs:lnRef idx="0"/>
+    <cs:fillRef idx="0"/>
+    <cs:effectRef idx="0"/>
+    <cs:fontRef idx="minor">
+      <a:schemeClr val="lt1"/>
+    </cs:fontRef>
+    <cs:spPr>
+      <a:pattFill prst="pct75">
+        <a:fgClr>
+          <a:schemeClr val="dk1">
+            <a:lumMod val="75000"/>
+            <a:lumOff val="25000"/>
+          </a:schemeClr>
+        </a:fgClr>
+        <a:bgClr>
+          <a:schemeClr val="dk1">
+            <a:lumMod val="65000"/>
+            <a:lumOff val="35000"/>
+          </a:schemeClr>
+        </a:bgClr>
+      </a:pattFill>
+      <a:effectLst>
+        <a:outerShdw blurRad="50800" dist="38100" dir="2700000" algn="tl" rotWithShape="0">
+          <a:prstClr val="black">
+            <a:alpha val="40000"/>
+          </a:prstClr>
+        </a:outerShdw>
+      </a:effectLst>
+    </cs:spPr>
+    <cs:defRPr sz="1330" b="1" i="0" u="none" strike="noStrike" kern="1200" baseline="0"/>
+  </cs:dataLabel>
+  <cs:dataLabelCallout>
+    <cs:lnRef idx="0"/>
+    <cs:fillRef idx="0"/>
+    <cs:effectRef idx="0"/>
+    <cs:fontRef idx="minor">
+      <a:schemeClr val="lt1"/>
+    </cs:fontRef>
+    <cs:spPr>
+      <a:pattFill prst="pct75">
+        <a:fgClr>
+          <a:schemeClr val="dk1">
+            <a:lumMod val="75000"/>
+            <a:lumOff val="25000"/>
+          </a:schemeClr>
+        </a:fgClr>
+        <a:bgClr>
+          <a:schemeClr val="dk1">
+            <a:lumMod val="65000"/>
+            <a:lumOff val="35000"/>
+          </a:schemeClr>
+        </a:bgClr>
+      </a:pattFill>
+      <a:effectLst>
+        <a:outerShdw blurRad="50800" dist="38100" dir="2700000" algn="tl" rotWithShape="0">
+          <a:prstClr val="black">
+            <a:alpha val="40000"/>
+          </a:prstClr>
+        </a:outerShdw>
+      </a:effectLst>
+    </cs:spPr>
+    <cs:defRPr sz="1330" b="1" i="0" u="none" strike="noStrike" kern="1200" baseline="0"/>
+    <cs:bodyPr rot="0" spcFirstLastPara="1" vertOverflow="clip" horzOverflow="clip" vert="horz" wrap="square" lIns="36576" tIns="18288" rIns="36576" bIns="18288" anchor="ctr" anchorCtr="1">
+      <a:spAutoFit/>
+    </cs:bodyPr>
+  </cs:dataLabelCallout>
+  <cs:dataPoint>
+    <cs:lnRef idx="0"/>
+    <cs:fillRef idx="0">
+      <cs:styleClr val="auto"/>
+    </cs:fillRef>
+    <cs:effectRef idx="0"/>
+    <cs:fontRef idx="minor">
+      <a:schemeClr val="dk1"/>
+    </cs:fontRef>
+    <cs:spPr>
+      <a:solidFill>
+        <a:schemeClr val="phClr"/>
+      </a:solidFill>
+      <a:effectLst>
+        <a:outerShdw blurRad="254000" sx="102000" sy="102000" algn="ctr" rotWithShape="0">
+          <a:prstClr val="black">
+            <a:alpha val="20000"/>
+          </a:prstClr>
+        </a:outerShdw>
+      </a:effectLst>
+    </cs:spPr>
+  </cs:dataPoint>
+  <cs:dataPoint3D>
+    <cs:lnRef idx="0"/>
+    <cs:fillRef idx="0">
+      <cs:styleClr val="auto"/>
+    </cs:fillRef>
+    <cs:effectRef idx="0"/>
+    <cs:fontRef idx="minor">
+      <a:schemeClr val="dk1"/>
+    </cs:fontRef>
+    <cs:spPr>
+      <a:solidFill>
+        <a:schemeClr val="phClr"/>
+      </a:solidFill>
+      <a:effectLst>
+        <a:outerShdw blurRad="254000" sx="102000" sy="102000" algn="ctr" rotWithShape="0">
+          <a:prstClr val="black">
+            <a:alpha val="20000"/>
+          </a:prstClr>
+        </a:outerShdw>
+      </a:effectLst>
+    </cs:spPr>
+  </cs:dataPoint3D>
+  <cs:dataPointLine>
+    <cs:lnRef idx="0">
+      <cs:styleClr val="auto"/>
+    </cs:lnRef>
+    <cs:fillRef idx="0"/>
+    <cs:effectRef idx="0"/>
+    <cs:fontRef idx="minor">
+      <a:schemeClr val="dk1"/>
+    </cs:fontRef>
+    <cs:spPr>
+      <a:ln w="31750" cap="rnd">
+        <a:solidFill>
+          <a:schemeClr val="phClr">
+            <a:alpha val="85000"/>
+          </a:schemeClr>
+        </a:solidFill>
+        <a:round/>
+      </a:ln>
+    </cs:spPr>
+  </cs:dataPointLine>
+  <cs:dataPointMarker>
+    <cs:lnRef idx="0"/>
+    <cs:fillRef idx="0">
+      <cs:styleClr val="auto"/>
+    </cs:fillRef>
+    <cs:effectRef idx="0"/>
+    <cs:fontRef idx="minor">
+      <a:schemeClr val="dk1"/>
+    </cs:fontRef>
+    <cs:spPr>
+      <a:solidFill>
+        <a:schemeClr val="phClr">
+          <a:alpha val="85000"/>
+        </a:schemeClr>
+      </a:solidFill>
+    </cs:spPr>
+  </cs:dataPointMarker>
+  <cs:dataPointMarkerLayout symbol="circle" size="6"/>
+  <cs:dataPointWireframe>
+    <cs:lnRef idx="0">
+      <cs:styleClr val="auto"/>
+    </cs:lnRef>
+    <cs:fillRef idx="0"/>
+    <cs:effectRef idx="0"/>
+    <cs:fontRef idx="minor">
+      <a:schemeClr val="dk1"/>
+    </cs:fontRef>
+    <cs:spPr>
+      <a:ln w="9525" cap="rnd">
+        <a:solidFill>
+          <a:schemeClr val="phClr"/>
+        </a:solidFill>
+        <a:round/>
+      </a:ln>
+    </cs:spPr>
+  </cs:dataPointWireframe>
+  <cs:dataTable>
+    <cs:lnRef idx="0"/>
+    <cs:fillRef idx="0"/>
+    <cs:effectRef idx="0"/>
+    <cs:fontRef idx="minor">
+      <a:schemeClr val="dk1">
+        <a:lumMod val="75000"/>
+        <a:lumOff val="25000"/>
+      </a:schemeClr>
+    </cs:fontRef>
+    <cs:spPr>
+      <a:ln w="9525">
+        <a:solidFill>
+          <a:schemeClr val="dk1">
+            <a:lumMod val="35000"/>
+            <a:lumOff val="65000"/>
+          </a:schemeClr>
+        </a:solidFill>
+      </a:ln>
+    </cs:spPr>
+    <cs:defRPr sz="1197" kern="1200"/>
+  </cs:dataTable>
+  <cs:downBar>
+    <cs:lnRef idx="0"/>
+    <cs:fillRef idx="0"/>
+    <cs:effectRef idx="0"/>
+    <cs:fontRef idx="minor">
+      <a:schemeClr val="dk1"/>
+    </cs:fontRef>
+    <cs:spPr>
+      <a:solidFill>
+        <a:schemeClr val="dk1">
+          <a:lumMod val="50000"/>
+          <a:lumOff val="50000"/>
+        </a:schemeClr>
+      </a:solidFill>
+      <a:ln w="9525">
+        <a:solidFill>
+          <a:schemeClr val="dk1">
+            <a:lumMod val="65000"/>
+            <a:lumOff val="35000"/>
+          </a:schemeClr>
+        </a:solidFill>
+      </a:ln>
+    </cs:spPr>
+  </cs:downBar>
+  <cs:dropLine>
+    <cs:lnRef idx="0"/>
+    <cs:fillRef idx="0"/>
+    <cs:effectRef idx="0"/>
+    <cs:fontRef idx="minor">
+      <a:schemeClr val="dk1"/>
+    </cs:fontRef>
+    <cs:spPr>
+      <a:ln w="9525">
+        <a:solidFill>
+          <a:schemeClr val="dk1">
+            <a:lumMod val="35000"/>
+            <a:lumOff val="65000"/>
+          </a:schemeClr>
+        </a:solidFill>
+        <a:prstDash val="dash"/>
+      </a:ln>
+    </cs:spPr>
+  </cs:dropLine>
+  <cs:errorBar>
+    <cs:lnRef idx="0"/>
+    <cs:fillRef idx="0"/>
+    <cs:effectRef idx="0"/>
+    <cs:fontRef idx="minor">
+      <a:schemeClr val="dk1"/>
+    </cs:fontRef>
+    <cs:spPr>
+      <a:ln w="9525">
+        <a:solidFill>
+          <a:schemeClr val="dk1">
+            <a:lumMod val="65000"/>
+            <a:lumOff val="35000"/>
+          </a:schemeClr>
+        </a:solidFill>
+        <a:round/>
+      </a:ln>
+    </cs:spPr>
+  </cs:errorBar>
+  <cs:floor>
+    <cs:lnRef idx="0"/>
+    <cs:fillRef idx="0"/>
+    <cs:effectRef idx="0"/>
+    <cs:fontRef idx="minor">
+      <a:schemeClr val="dk1"/>
+    </cs:fontRef>
+  </cs:floor>
+  <cs:gridlineMajor>
+    <cs:lnRef idx="0"/>
+    <cs:fillRef idx="0"/>
+    <cs:effectRef idx="0"/>
+    <cs:fontRef idx="minor">
+      <a:schemeClr val="dk1"/>
+    </cs:fontRef>
+    <cs:spPr>
+      <a:ln w="9525" cap="flat" cmpd="sng" algn="ctr">
+        <a:gradFill>
+          <a:gsLst>
+            <a:gs pos="100000">
+              <a:schemeClr val="dk1">
+                <a:lumMod val="95000"/>
+                <a:lumOff val="5000"/>
+                <a:alpha val="42000"/>
+              </a:schemeClr>
+            </a:gs>
+            <a:gs pos="0">
+              <a:schemeClr val="lt1">
+                <a:lumMod val="75000"/>
+                <a:alpha val="36000"/>
+              </a:schemeClr>
+            </a:gs>
+          </a:gsLst>
+          <a:lin ang="5400000" scaled="0"/>
+        </a:gradFill>
+        <a:round/>
+      </a:ln>
+    </cs:spPr>
+  </cs:gridlineMajor>
+  <cs:gridlineMinor>
+    <cs:lnRef idx="0"/>
+    <cs:fillRef idx="0"/>
+    <cs:effectRef idx="0"/>
+    <cs:fontRef idx="minor">
+      <a:schemeClr val="dk1"/>
+    </cs:fontRef>
+    <cs:spPr>
+      <a:ln>
+        <a:gradFill>
+          <a:gsLst>
+            <a:gs pos="100000">
+              <a:schemeClr val="dk1">
+                <a:lumMod val="95000"/>
+                <a:lumOff val="5000"/>
+                <a:alpha val="42000"/>
+              </a:schemeClr>
+            </a:gs>
+            <a:gs pos="0">
+              <a:schemeClr val="lt1">
+                <a:lumMod val="75000"/>
+                <a:alpha val="36000"/>
+              </a:schemeClr>
+            </a:gs>
+          </a:gsLst>
+          <a:lin ang="5400000" scaled="0"/>
+        </a:gradFill>
+      </a:ln>
+    </cs:spPr>
+  </cs:gridlineMinor>
+  <cs:hiLoLine>
+    <cs:lnRef idx="0"/>
+    <cs:fillRef idx="0"/>
+    <cs:effectRef idx="0"/>
+    <cs:fontRef idx="minor">
+      <a:schemeClr val="dk1"/>
+    </cs:fontRef>
+    <cs:spPr>
+      <a:ln w="9525">
+        <a:solidFill>
+          <a:schemeClr val="dk1">
+            <a:lumMod val="35000"/>
+            <a:lumOff val="65000"/>
+          </a:schemeClr>
+        </a:solidFill>
+        <a:prstDash val="dash"/>
+      </a:ln>
+    </cs:spPr>
+  </cs:hiLoLine>
+  <cs:leaderLine>
+    <cs:lnRef idx="0"/>
+    <cs:fillRef idx="0"/>
+    <cs:effectRef idx="0"/>
+    <cs:fontRef idx="minor">
+      <a:schemeClr val="dk1"/>
+    </cs:fontRef>
+    <cs:spPr>
+      <a:ln w="9525">
+        <a:solidFill>
+          <a:schemeClr val="dk1">
+            <a:lumMod val="50000"/>
+            <a:lumOff val="50000"/>
+          </a:schemeClr>
+        </a:solidFill>
+      </a:ln>
+    </cs:spPr>
+  </cs:leaderLine>
+  <cs:legend>
+    <cs:lnRef idx="0"/>
+    <cs:fillRef idx="0"/>
+    <cs:effectRef idx="0"/>
+    <cs:fontRef idx="minor">
+      <a:schemeClr val="dk1">
+        <a:lumMod val="75000"/>
+        <a:lumOff val="25000"/>
+      </a:schemeClr>
+    </cs:fontRef>
+    <cs:spPr>
+      <a:solidFill>
+        <a:schemeClr val="lt1">
+          <a:lumMod val="95000"/>
+          <a:alpha val="39000"/>
+        </a:schemeClr>
+      </a:solidFill>
+    </cs:spPr>
+    <cs:defRPr sz="1197" kern="1200"/>
+  </cs:legend>
+  <cs:plotArea>
+    <cs:lnRef idx="0"/>
+    <cs:fillRef idx="0"/>
+    <cs:effectRef idx="0"/>
+    <cs:fontRef idx="minor">
+      <a:schemeClr val="dk1"/>
+    </cs:fontRef>
+  </cs:plotArea>
+  <cs:plotArea3D>
+    <cs:lnRef idx="0"/>
+    <cs:fillRef idx="0"/>
+    <cs:effectRef idx="0"/>
+    <cs:fontRef idx="minor">
+      <a:schemeClr val="dk1"/>
+    </cs:fontRef>
+  </cs:plotArea3D>
+  <cs:seriesAxis>
+    <cs:lnRef idx="0"/>
+    <cs:fillRef idx="0"/>
+    <cs:effectRef idx="0"/>
+    <cs:fontRef idx="minor">
+      <a:schemeClr val="dk1">
+        <a:lumMod val="75000"/>
+        <a:lumOff val="25000"/>
+      </a:schemeClr>
+    </cs:fontRef>
+    <cs:spPr>
+      <a:ln w="31750" cap="flat" cmpd="sng" algn="ctr">
+        <a:solidFill>
+          <a:schemeClr val="dk1">
+            <a:lumMod val="75000"/>
+            <a:lumOff val="25000"/>
+          </a:schemeClr>
+        </a:solidFill>
+        <a:round/>
+      </a:ln>
+    </cs:spPr>
+    <cs:defRPr sz="1197" kern="1200"/>
+  </cs:seriesAxis>
+  <cs:seriesLine>
+    <cs:lnRef idx="0"/>
+    <cs:fillRef idx="0"/>
+    <cs:effectRef idx="0"/>
+    <cs:fontRef idx="minor">
+      <a:schemeClr val="dk1"/>
+    </cs:fontRef>
+    <cs:spPr>
+      <a:ln w="9525">
+        <a:solidFill>
+          <a:schemeClr val="dk1">
+            <a:lumMod val="50000"/>
+            <a:lumOff val="50000"/>
+          </a:schemeClr>
+        </a:solidFill>
+        <a:round/>
+      </a:ln>
+    </cs:spPr>
+  </cs:seriesLine>
+  <cs:title>
+    <cs:lnRef idx="0"/>
+    <cs:fillRef idx="0"/>
+    <cs:effectRef idx="0"/>
+    <cs:fontRef idx="minor">
+      <a:schemeClr val="dk1">
+        <a:lumMod val="75000"/>
+        <a:lumOff val="25000"/>
+      </a:schemeClr>
+    </cs:fontRef>
+    <cs:defRPr sz="2200" b="1" kern="1200" baseline="0"/>
+  </cs:title>
+  <cs:trendline>
+    <cs:lnRef idx="0">
+      <cs:styleClr val="auto"/>
+    </cs:lnRef>
+    <cs:fillRef idx="0"/>
+    <cs:effectRef idx="0"/>
+    <cs:fontRef idx="minor">
+      <a:schemeClr val="dk1"/>
+    </cs:fontRef>
+    <cs:spPr>
+      <a:ln w="19050" cap="rnd">
+        <a:solidFill>
+          <a:schemeClr val="phClr"/>
+        </a:solidFill>
+      </a:ln>
+    </cs:spPr>
+  </cs:trendline>
+  <cs:trendlineLabel>
+    <cs:lnRef idx="0"/>
+    <cs:fillRef idx="0"/>
+    <cs:effectRef idx="0"/>
+    <cs:fontRef idx="minor">
+      <a:schemeClr val="dk1">
+        <a:lumMod val="75000"/>
+        <a:lumOff val="25000"/>
+      </a:schemeClr>
+    </cs:fontRef>
+    <cs:defRPr sz="1197" kern="1200"/>
+  </cs:trendlineLabel>
+  <cs:upBar>
+    <cs:lnRef idx="0"/>
+    <cs:fillRef idx="0"/>
+    <cs:effectRef idx="0"/>
+    <cs:fontRef idx="minor">
+      <a:schemeClr val="dk1"/>
+    </cs:fontRef>
+    <cs:spPr>
+      <a:solidFill>
+        <a:schemeClr val="lt1"/>
+      </a:solidFill>
+      <a:ln w="9525">
+        <a:solidFill>
+          <a:schemeClr val="dk1">
+            <a:lumMod val="65000"/>
+            <a:lumOff val="35000"/>
+          </a:schemeClr>
+        </a:solidFill>
+      </a:ln>
+    </cs:spPr>
+  </cs:upBar>
+  <cs:valueAxis>
+    <cs:lnRef idx="0"/>
+    <cs:fillRef idx="0"/>
+    <cs:effectRef idx="0"/>
+    <cs:fontRef idx="minor">
+      <a:schemeClr val="dk1">
+        <a:lumMod val="75000"/>
+        <a:lumOff val="25000"/>
+      </a:schemeClr>
+    </cs:fontRef>
+    <cs:spPr>
+      <a:ln>
+        <a:noFill/>
+      </a:ln>
+    </cs:spPr>
+    <cs:defRPr sz="1197" kern="1200"/>
+  </cs:valueAxis>
+  <cs:wall>
+    <cs:lnRef idx="0"/>
+    <cs:fillRef idx="0"/>
+    <cs:effectRef idx="0"/>
+    <cs:fontRef idx="minor">
+      <a:schemeClr val="dk1"/>
+    </cs:fontRef>
+  </cs:wall>
+</cs:chartStyle>
+</file>
+
 <file path=ppt/slideLayouts/slideLayout1.xml><?xml version="1.0" encoding="utf-8"?>
 <p:sldLayout xmlns:a="http://schemas.openxmlformats.org/drawingml/2006/main" xmlns:r="http://schemas.openxmlformats.org/officeDocument/2006/relationships" xmlns:p="http://schemas.openxmlformats.org/presentationml/2006/main" type="title" preserve="1">
   <p:cSld name="Титульный слайд">
@@ -306,7 +1327,7 @@
           <a:p>
             <a:fld id="{8720104C-3C9D-4B62-9936-5C987D21D7C9}" type="datetimeFigureOut">
               <a:rPr lang="ru-RU" smtClean="0"/>
-              <a:t>14.05.2023</a:t>
+              <a:t>30.05.2023</a:t>
             </a:fld>
             <a:endParaRPr lang="ru-RU"/>
           </a:p>
@@ -581,7 +1602,7 @@
           <a:p>
             <a:fld id="{8720104C-3C9D-4B62-9936-5C987D21D7C9}" type="datetimeFigureOut">
               <a:rPr lang="ru-RU" smtClean="0"/>
-              <a:t>14.05.2023</a:t>
+              <a:t>30.05.2023</a:t>
             </a:fld>
             <a:endParaRPr lang="ru-RU"/>
           </a:p>
@@ -775,7 +1796,7 @@
           <a:p>
             <a:fld id="{8720104C-3C9D-4B62-9936-5C987D21D7C9}" type="datetimeFigureOut">
               <a:rPr lang="ru-RU" smtClean="0"/>
-              <a:t>14.05.2023</a:t>
+              <a:t>30.05.2023</a:t>
             </a:fld>
             <a:endParaRPr lang="ru-RU"/>
           </a:p>
@@ -1048,7 +2069,7 @@
           <a:p>
             <a:fld id="{8720104C-3C9D-4B62-9936-5C987D21D7C9}" type="datetimeFigureOut">
               <a:rPr lang="ru-RU" smtClean="0"/>
-              <a:t>14.05.2023</a:t>
+              <a:t>30.05.2023</a:t>
             </a:fld>
             <a:endParaRPr lang="ru-RU"/>
           </a:p>
@@ -1389,7 +2410,7 @@
           <a:p>
             <a:fld id="{8720104C-3C9D-4B62-9936-5C987D21D7C9}" type="datetimeFigureOut">
               <a:rPr lang="ru-RU" smtClean="0"/>
-              <a:t>14.05.2023</a:t>
+              <a:t>30.05.2023</a:t>
             </a:fld>
             <a:endParaRPr lang="ru-RU"/>
           </a:p>
@@ -2012,7 +3033,7 @@
           <a:p>
             <a:fld id="{8720104C-3C9D-4B62-9936-5C987D21D7C9}" type="datetimeFigureOut">
               <a:rPr lang="ru-RU" smtClean="0"/>
-              <a:t>14.05.2023</a:t>
+              <a:t>30.05.2023</a:t>
             </a:fld>
             <a:endParaRPr lang="ru-RU"/>
           </a:p>
@@ -2872,7 +3893,7 @@
           <a:p>
             <a:fld id="{8720104C-3C9D-4B62-9936-5C987D21D7C9}" type="datetimeFigureOut">
               <a:rPr lang="ru-RU" smtClean="0"/>
-              <a:t>14.05.2023</a:t>
+              <a:t>30.05.2023</a:t>
             </a:fld>
             <a:endParaRPr lang="ru-RU"/>
           </a:p>
@@ -3042,7 +4063,7 @@
           <a:p>
             <a:fld id="{8720104C-3C9D-4B62-9936-5C987D21D7C9}" type="datetimeFigureOut">
               <a:rPr lang="ru-RU" smtClean="0"/>
-              <a:t>14.05.2023</a:t>
+              <a:t>30.05.2023</a:t>
             </a:fld>
             <a:endParaRPr lang="ru-RU"/>
           </a:p>
@@ -3222,7 +4243,7 @@
           <a:p>
             <a:fld id="{8720104C-3C9D-4B62-9936-5C987D21D7C9}" type="datetimeFigureOut">
               <a:rPr lang="ru-RU" smtClean="0"/>
-              <a:t>14.05.2023</a:t>
+              <a:t>30.05.2023</a:t>
             </a:fld>
             <a:endParaRPr lang="ru-RU"/>
           </a:p>
@@ -3392,7 +4413,7 @@
           <a:p>
             <a:fld id="{8720104C-3C9D-4B62-9936-5C987D21D7C9}" type="datetimeFigureOut">
               <a:rPr lang="ru-RU" smtClean="0"/>
-              <a:t>14.05.2023</a:t>
+              <a:t>30.05.2023</a:t>
             </a:fld>
             <a:endParaRPr lang="ru-RU"/>
           </a:p>
@@ -3639,7 +4660,7 @@
           <a:p>
             <a:fld id="{8720104C-3C9D-4B62-9936-5C987D21D7C9}" type="datetimeFigureOut">
               <a:rPr lang="ru-RU" smtClean="0"/>
-              <a:t>14.05.2023</a:t>
+              <a:t>30.05.2023</a:t>
             </a:fld>
             <a:endParaRPr lang="ru-RU"/>
           </a:p>
@@ -3931,7 +4952,7 @@
           <a:p>
             <a:fld id="{8720104C-3C9D-4B62-9936-5C987D21D7C9}" type="datetimeFigureOut">
               <a:rPr lang="ru-RU" smtClean="0"/>
-              <a:t>14.05.2023</a:t>
+              <a:t>30.05.2023</a:t>
             </a:fld>
             <a:endParaRPr lang="ru-RU"/>
           </a:p>
@@ -4375,7 +5396,7 @@
           <a:p>
             <a:fld id="{8720104C-3C9D-4B62-9936-5C987D21D7C9}" type="datetimeFigureOut">
               <a:rPr lang="ru-RU" smtClean="0"/>
-              <a:t>14.05.2023</a:t>
+              <a:t>30.05.2023</a:t>
             </a:fld>
             <a:endParaRPr lang="ru-RU"/>
           </a:p>
@@ -4493,7 +5514,7 @@
           <a:p>
             <a:fld id="{8720104C-3C9D-4B62-9936-5C987D21D7C9}" type="datetimeFigureOut">
               <a:rPr lang="ru-RU" smtClean="0"/>
-              <a:t>14.05.2023</a:t>
+              <a:t>30.05.2023</a:t>
             </a:fld>
             <a:endParaRPr lang="ru-RU"/>
           </a:p>
@@ -4588,7 +5609,7 @@
           <a:p>
             <a:fld id="{8720104C-3C9D-4B62-9936-5C987D21D7C9}" type="datetimeFigureOut">
               <a:rPr lang="ru-RU" smtClean="0"/>
-              <a:t>14.05.2023</a:t>
+              <a:t>30.05.2023</a:t>
             </a:fld>
             <a:endParaRPr lang="ru-RU"/>
           </a:p>
@@ -4867,7 +5888,7 @@
           <a:p>
             <a:fld id="{8720104C-3C9D-4B62-9936-5C987D21D7C9}" type="datetimeFigureOut">
               <a:rPr lang="ru-RU" smtClean="0"/>
-              <a:t>14.05.2023</a:t>
+              <a:t>30.05.2023</a:t>
             </a:fld>
             <a:endParaRPr lang="ru-RU"/>
           </a:p>
@@ -5142,7 +6163,7 @@
           <a:p>
             <a:fld id="{8720104C-3C9D-4B62-9936-5C987D21D7C9}" type="datetimeFigureOut">
               <a:rPr lang="ru-RU" smtClean="0"/>
-              <a:t>14.05.2023</a:t>
+              <a:t>30.05.2023</a:t>
             </a:fld>
             <a:endParaRPr lang="ru-RU"/>
           </a:p>
@@ -5571,7 +6592,7 @@
           <a:p>
             <a:fld id="{8720104C-3C9D-4B62-9936-5C987D21D7C9}" type="datetimeFigureOut">
               <a:rPr lang="ru-RU" smtClean="0"/>
-              <a:t>14.05.2023</a:t>
+              <a:t>30.05.2023</a:t>
             </a:fld>
             <a:endParaRPr lang="ru-RU"/>
           </a:p>
@@ -6221,25 +7242,8 @@
                 <a:latin typeface="Times New Roman" panose="02020603050405020304" pitchFamily="18" charset="0"/>
                 <a:cs typeface="Times New Roman" panose="02020603050405020304" pitchFamily="18" charset="0"/>
               </a:rPr>
-              <a:t>Выполнил: </a:t>
-            </a:r>
-            <a:r>
-              <a:rPr lang="ru-RU" sz="2400" dirty="0" smtClean="0">
-                <a:solidFill>
-                  <a:schemeClr val="tx1"/>
-                </a:solidFill>
-                <a:latin typeface="Times New Roman" panose="02020603050405020304" pitchFamily="18" charset="0"/>
-                <a:cs typeface="Times New Roman" panose="02020603050405020304" pitchFamily="18" charset="0"/>
-              </a:rPr>
-              <a:t>Козин А. А.</a:t>
-            </a:r>
-            <a:endParaRPr lang="ru-RU" sz="2400" dirty="0" smtClean="0">
-              <a:solidFill>
-                <a:schemeClr val="tx1"/>
-              </a:solidFill>
-              <a:latin typeface="Times New Roman" panose="02020603050405020304" pitchFamily="18" charset="0"/>
-              <a:cs typeface="Times New Roman" panose="02020603050405020304" pitchFamily="18" charset="0"/>
-            </a:endParaRPr>
+              <a:t>Выполнил: Козин А. А.</a:t>
+            </a:r>
           </a:p>
           <a:p>
             <a:r>
@@ -6461,17 +7465,7 @@
                 <a:latin typeface="Times New Roman" panose="02020603050405020304" pitchFamily="18" charset="0"/>
                 <a:cs typeface="Times New Roman" panose="02020603050405020304" pitchFamily="18" charset="0"/>
               </a:rPr>
-              <a:t>СХЕМА </a:t>
-            </a:r>
-            <a:r>
-              <a:rPr lang="ru-RU" sz="2800" dirty="0" smtClean="0">
-                <a:solidFill>
-                  <a:schemeClr val="tx1"/>
-                </a:solidFill>
-                <a:latin typeface="Times New Roman" panose="02020603050405020304" pitchFamily="18" charset="0"/>
-                <a:cs typeface="Times New Roman" panose="02020603050405020304" pitchFamily="18" charset="0"/>
-              </a:rPr>
-              <a:t>ЩИТА </a:t>
+              <a:t>СХЕМА ЩИТА </a:t>
             </a:r>
             <a:r>
               <a:rPr lang="ru-RU" sz="2800" dirty="0">
@@ -6892,7 +7886,7 @@
         <p:spPr>
           <a:xfrm>
             <a:off x="304798" y="277091"/>
-            <a:ext cx="7273637" cy="1136074"/>
+            <a:ext cx="3740729" cy="1136074"/>
           </a:xfrm>
         </p:spPr>
         <p:txBody>
@@ -6919,17 +7913,7 @@
                 <a:latin typeface="Times New Roman" panose="02020603050405020304" pitchFamily="18" charset="0"/>
                 <a:cs typeface="Times New Roman" panose="02020603050405020304" pitchFamily="18" charset="0"/>
               </a:rPr>
-              <a:t>ЩИТА </a:t>
-            </a:r>
-            <a:r>
-              <a:rPr lang="ru-RU" dirty="0" smtClean="0">
-                <a:solidFill>
-                  <a:schemeClr val="tx1"/>
-                </a:solidFill>
-                <a:latin typeface="Times New Roman" panose="02020603050405020304" pitchFamily="18" charset="0"/>
-                <a:cs typeface="Times New Roman" panose="02020603050405020304" pitchFamily="18" charset="0"/>
-              </a:rPr>
-              <a:t>УПРАВЛЕНИЯ</a:t>
+              <a:t>ЩИТА УПРАВЛЕНИЯ</a:t>
             </a:r>
             <a:endParaRPr lang="ru-RU" dirty="0"/>
           </a:p>
@@ -6960,49 +7944,8 @@
         </p:blipFill>
         <p:spPr bwMode="auto">
           <a:xfrm>
-            <a:off x="7578435" y="128500"/>
-            <a:ext cx="4582175" cy="6529310"/>
-          </a:xfrm>
-          <a:prstGeom prst="rect">
-            <a:avLst/>
-          </a:prstGeom>
-          <a:noFill/>
-          <a:extLst>
-            <a:ext uri="{909E8E84-426E-40DD-AFC4-6F175D3DCCD1}">
-              <a14:hiddenFill xmlns:a14="http://schemas.microsoft.com/office/drawing/2010/main">
-                <a:solidFill>
-                  <a:srgbClr val="FFFFFF"/>
-                </a:solidFill>
-              </a14:hiddenFill>
-            </a:ext>
-          </a:extLst>
-        </p:spPr>
-      </p:pic>
-      <p:pic>
-        <p:nvPicPr>
-          <p:cNvPr id="3076" name="Picture 4" descr="https://inomix.ru/wp-content/uploads/1/1/1/111b19827e8e22912fb3f3790d645de0.jpeg"/>
-          <p:cNvPicPr>
-            <a:picLocks noChangeAspect="1" noChangeArrowheads="1"/>
-          </p:cNvPicPr>
-          <p:nvPr/>
-        </p:nvPicPr>
-        <p:blipFill>
-          <a:blip r:embed="rId3">
-            <a:extLst>
-              <a:ext uri="{28A0092B-C50C-407E-A947-70E740481C1C}">
-                <a14:useLocalDpi xmlns:a14="http://schemas.microsoft.com/office/drawing/2010/main" val="0"/>
-              </a:ext>
-            </a:extLst>
-          </a:blip>
-          <a:srcRect/>
-          <a:stretch>
-            <a:fillRect/>
-          </a:stretch>
-        </p:blipFill>
-        <p:spPr bwMode="auto">
-          <a:xfrm>
-            <a:off x="304798" y="1561756"/>
-            <a:ext cx="6381750" cy="4552951"/>
+            <a:off x="5029199" y="166255"/>
+            <a:ext cx="5056910" cy="6529310"/>
           </a:xfrm>
           <a:prstGeom prst="rect">
             <a:avLst/>
@@ -7115,47 +8058,207 @@
           </a:p>
         </p:txBody>
       </p:sp>
-      <p:pic>
-        <p:nvPicPr>
-          <p:cNvPr id="4108" name="Picture 12" descr="https://lh3.googleusercontent.com/xqfDTKk5en7nvQTm51A9iJD1e5O0zSDPcgYrxIubbjd70dOEyelnJnsuaxplljoNAjnowVk-oAcEYLNrsP0MP3NCHEsjPL0SYBOYuc8"/>
-          <p:cNvPicPr>
-            <a:picLocks noChangeAspect="1" noChangeArrowheads="1"/>
-          </p:cNvPicPr>
-          <p:nvPr/>
-        </p:nvPicPr>
-        <p:blipFill>
-          <a:blip r:embed="rId2">
-            <a:extLst>
-              <a:ext uri="{28A0092B-C50C-407E-A947-70E740481C1C}">
-                <a14:useLocalDpi xmlns:a14="http://schemas.microsoft.com/office/drawing/2010/main" val="0"/>
-              </a:ext>
-            </a:extLst>
-          </a:blip>
-          <a:srcRect/>
-          <a:stretch>
-            <a:fillRect/>
-          </a:stretch>
-        </p:blipFill>
-        <p:spPr bwMode="auto">
-          <a:xfrm>
-            <a:off x="1114496" y="1787237"/>
-            <a:ext cx="9606285" cy="4482934"/>
-          </a:xfrm>
-          <a:prstGeom prst="rect">
-            <a:avLst/>
-          </a:prstGeom>
-          <a:noFill/>
-          <a:extLst>
-            <a:ext uri="{909E8E84-426E-40DD-AFC4-6F175D3DCCD1}">
-              <a14:hiddenFill xmlns:a14="http://schemas.microsoft.com/office/drawing/2010/main">
-                <a:solidFill>
-                  <a:srgbClr val="FFFFFF"/>
-                </a:solidFill>
-              </a14:hiddenFill>
-            </a:ext>
-          </a:extLst>
-        </p:spPr>
-      </p:pic>
+      <p:graphicFrame>
+        <p:nvGraphicFramePr>
+          <p:cNvPr id="5" name="Таблица 4"/>
+          <p:cNvGraphicFramePr>
+            <a:graphicFrameLocks noGrp="1"/>
+          </p:cNvGraphicFramePr>
+          <p:nvPr>
+            <p:extLst>
+              <p:ext uri="{D42A27DB-BD31-4B8C-83A1-F6EECF244321}">
+                <p14:modId xmlns:p14="http://schemas.microsoft.com/office/powerpoint/2010/main" val="1592092921"/>
+              </p:ext>
+            </p:extLst>
+          </p:nvPr>
+        </p:nvGraphicFramePr>
+        <p:xfrm>
+          <a:off x="1260764" y="1620981"/>
+          <a:ext cx="10072254" cy="4655127"/>
+        </p:xfrm>
+        <a:graphic>
+          <a:graphicData uri="http://schemas.openxmlformats.org/drawingml/2006/table">
+            <a:tbl>
+              <a:tblPr bandRow="1">
+                <a:tableStyleId>{5C22544A-7EE6-4342-B048-85BDC9FD1C3A}</a:tableStyleId>
+              </a:tblPr>
+              <a:tblGrid>
+                <a:gridCol w="7093527">
+                  <a:extLst>
+                    <a:ext uri="{9D8B030D-6E8A-4147-A177-3AD203B41FA5}">
+                      <a16:colId xmlns:a16="http://schemas.microsoft.com/office/drawing/2014/main" val="33841265"/>
+                    </a:ext>
+                  </a:extLst>
+                </a:gridCol>
+                <a:gridCol w="2978727">
+                  <a:extLst>
+                    <a:ext uri="{9D8B030D-6E8A-4147-A177-3AD203B41FA5}">
+                      <a16:colId xmlns:a16="http://schemas.microsoft.com/office/drawing/2014/main" val="1625311254"/>
+                    </a:ext>
+                  </a:extLst>
+                </a:gridCol>
+              </a:tblGrid>
+              <a:tr h="982275">
+                <a:tc>
+                  <a:txBody>
+                    <a:bodyPr/>
+                    <a:lstStyle/>
+                    <a:p>
+                      <a:r>
+                        <a:rPr lang="ru-RU" sz="4000" kern="1200" dirty="0" smtClean="0">
+                          <a:solidFill>
+                            <a:schemeClr val="dk1"/>
+                          </a:solidFill>
+                          <a:effectLst/>
+                          <a:latin typeface="+mn-lt"/>
+                          <a:ea typeface="+mn-ea"/>
+                          <a:cs typeface="+mn-cs"/>
+                        </a:rPr>
+                        <a:t>Площадь окон</a:t>
+                      </a:r>
+                      <a:endParaRPr lang="ru-RU" sz="4000" dirty="0"/>
+                    </a:p>
+                  </a:txBody>
+                  <a:tcPr/>
+                </a:tc>
+                <a:tc>
+                  <a:txBody>
+                    <a:bodyPr/>
+                    <a:lstStyle/>
+                    <a:p>
+                      <a:r>
+                        <a:rPr lang="ru-RU" sz="4000" kern="1200" dirty="0" smtClean="0">
+                          <a:solidFill>
+                            <a:schemeClr val="dk1"/>
+                          </a:solidFill>
+                          <a:effectLst/>
+                          <a:latin typeface="+mn-lt"/>
+                          <a:ea typeface="+mn-ea"/>
+                          <a:cs typeface="+mn-cs"/>
+                        </a:rPr>
+                        <a:t>18,81 м</a:t>
+                      </a:r>
+                      <a:r>
+                        <a:rPr lang="ru-RU" sz="4000" kern="1200" baseline="30000" dirty="0" smtClean="0">
+                          <a:solidFill>
+                            <a:schemeClr val="dk1"/>
+                          </a:solidFill>
+                          <a:effectLst/>
+                          <a:latin typeface="+mn-lt"/>
+                          <a:ea typeface="+mn-ea"/>
+                          <a:cs typeface="+mn-cs"/>
+                        </a:rPr>
+                        <a:t>2</a:t>
+                      </a:r>
+                      <a:endParaRPr lang="ru-RU" sz="4000" dirty="0"/>
+                    </a:p>
+                  </a:txBody>
+                  <a:tcPr/>
+                </a:tc>
+                <a:extLst>
+                  <a:ext uri="{0D108BD9-81ED-4DB2-BD59-A6C34878D82A}">
+                    <a16:rowId xmlns:a16="http://schemas.microsoft.com/office/drawing/2014/main" val="48099438"/>
+                  </a:ext>
+                </a:extLst>
+              </a:tr>
+              <a:tr h="1836426">
+                <a:tc>
+                  <a:txBody>
+                    <a:bodyPr/>
+                    <a:lstStyle/>
+                    <a:p>
+                      <a:r>
+                        <a:rPr lang="ru-RU" sz="4000" kern="1200" dirty="0" smtClean="0">
+                          <a:solidFill>
+                            <a:schemeClr val="dk1"/>
+                          </a:solidFill>
+                          <a:effectLst/>
+                          <a:latin typeface="+mn-lt"/>
+                          <a:ea typeface="+mn-ea"/>
+                          <a:cs typeface="+mn-cs"/>
+                        </a:rPr>
+                        <a:t>Индекс помещения</a:t>
+                      </a:r>
+                      <a:endParaRPr lang="ru-RU" sz="4000" dirty="0"/>
+                    </a:p>
+                  </a:txBody>
+                  <a:tcPr/>
+                </a:tc>
+                <a:tc>
+                  <a:txBody>
+                    <a:bodyPr/>
+                    <a:lstStyle/>
+                    <a:p>
+                      <a:r>
+                        <a:rPr lang="ru-RU" sz="4000" dirty="0" smtClean="0"/>
+                        <a:t>1,375</a:t>
+                      </a:r>
+                      <a:endParaRPr lang="ru-RU" sz="4000" dirty="0"/>
+                    </a:p>
+                  </a:txBody>
+                  <a:tcPr/>
+                </a:tc>
+                <a:extLst>
+                  <a:ext uri="{0D108BD9-81ED-4DB2-BD59-A6C34878D82A}">
+                    <a16:rowId xmlns:a16="http://schemas.microsoft.com/office/drawing/2014/main" val="2965245775"/>
+                  </a:ext>
+                </a:extLst>
+              </a:tr>
+              <a:tr h="1836426">
+                <a:tc>
+                  <a:txBody>
+                    <a:bodyPr/>
+                    <a:lstStyle/>
+                    <a:p>
+                      <a:r>
+                        <a:rPr lang="ru-RU" sz="4000" kern="1200" dirty="0" smtClean="0">
+                          <a:solidFill>
+                            <a:schemeClr val="dk1"/>
+                          </a:solidFill>
+                          <a:effectLst/>
+                          <a:latin typeface="+mn-lt"/>
+                          <a:ea typeface="+mn-ea"/>
+                          <a:cs typeface="+mn-cs"/>
+                        </a:rPr>
+                        <a:t>Количество светильников</a:t>
+                      </a:r>
+                      <a:endParaRPr lang="ru-RU" sz="4000" dirty="0"/>
+                    </a:p>
+                  </a:txBody>
+                  <a:tcPr/>
+                </a:tc>
+                <a:tc>
+                  <a:txBody>
+                    <a:bodyPr/>
+                    <a:lstStyle/>
+                    <a:p>
+                      <a:r>
+                        <a:rPr lang="ru-RU" sz="4000" kern="1200" dirty="0" smtClean="0">
+                          <a:solidFill>
+                            <a:schemeClr val="dk1"/>
+                          </a:solidFill>
+                          <a:effectLst/>
+                          <a:latin typeface="+mn-lt"/>
+                          <a:ea typeface="+mn-ea"/>
+                          <a:cs typeface="+mn-cs"/>
+                        </a:rPr>
+                        <a:t>40 шт.</a:t>
+                      </a:r>
+                      <a:endParaRPr lang="ru-RU" sz="4000" dirty="0"/>
+                    </a:p>
+                  </a:txBody>
+                  <a:tcPr/>
+                </a:tc>
+                <a:extLst>
+                  <a:ext uri="{0D108BD9-81ED-4DB2-BD59-A6C34878D82A}">
+                    <a16:rowId xmlns:a16="http://schemas.microsoft.com/office/drawing/2014/main" val="3381579036"/>
+                  </a:ext>
+                </a:extLst>
+              </a:tr>
+            </a:tbl>
+          </a:graphicData>
+        </a:graphic>
+      </p:graphicFrame>
     </p:spTree>
     <p:extLst>
       <p:ext uri="{BB962C8B-B14F-4D97-AF65-F5344CB8AC3E}">
@@ -7215,17 +8318,7 @@
                 <a:latin typeface="Times New Roman" panose="02020603050405020304" pitchFamily="18" charset="0"/>
                 <a:cs typeface="Times New Roman" panose="02020603050405020304" pitchFamily="18" charset="0"/>
               </a:rPr>
-              <a:t>ТЕХНИКО - ЭКОНОМИЧЕСКИЕ </a:t>
-            </a:r>
-            <a:r>
-              <a:rPr lang="ru-RU" dirty="0" smtClean="0">
-                <a:solidFill>
-                  <a:schemeClr val="tx1"/>
-                </a:solidFill>
-                <a:latin typeface="Times New Roman" panose="02020603050405020304" pitchFamily="18" charset="0"/>
-                <a:cs typeface="Times New Roman" panose="02020603050405020304" pitchFamily="18" charset="0"/>
-              </a:rPr>
-              <a:t>ПОКАЗАТЕЛИ</a:t>
+              <a:t>ТЕХНИКО - ЭКОНОМИЧЕСКИЕ ПОКАЗАТЕЛИ</a:t>
             </a:r>
             <a:endParaRPr lang="ru-RU" dirty="0">
               <a:solidFill>
@@ -7237,49 +8330,31 @@
           </a:p>
         </p:txBody>
       </p:sp>
-      <p:pic>
-        <p:nvPicPr>
-          <p:cNvPr id="5122" name="Picture 2" descr="5.13 Расчет технико-экономических показателей работы цеха"/>
-          <p:cNvPicPr>
-            <a:picLocks noGrp="1" noChangeAspect="1" noChangeArrowheads="1"/>
-          </p:cNvPicPr>
+      <p:graphicFrame>
+        <p:nvGraphicFramePr>
+          <p:cNvPr id="6" name="Объект 5"/>
+          <p:cNvGraphicFramePr>
+            <a:graphicFrameLocks noGrp="1"/>
+          </p:cNvGraphicFramePr>
           <p:nvPr>
             <p:ph idx="1"/>
-          </p:nvPr>
-        </p:nvPicPr>
-        <p:blipFill>
-          <a:blip r:embed="rId2">
-            <a:extLst>
-              <a:ext uri="{28A0092B-C50C-407E-A947-70E740481C1C}">
-                <a14:useLocalDpi xmlns:a14="http://schemas.microsoft.com/office/drawing/2010/main" val="0"/>
-              </a:ext>
-            </a:extLst>
-          </a:blip>
-          <a:srcRect/>
-          <a:stretch>
-            <a:fillRect/>
-          </a:stretch>
-        </p:blipFill>
-        <p:spPr bwMode="auto">
-          <a:xfrm>
-            <a:off x="2223017" y="1143358"/>
-            <a:ext cx="6933825" cy="5195818"/>
-          </a:xfrm>
-          <a:prstGeom prst="rect">
-            <a:avLst/>
-          </a:prstGeom>
-          <a:noFill/>
-          <a:extLst>
-            <a:ext uri="{909E8E84-426E-40DD-AFC4-6F175D3DCCD1}">
-              <a14:hiddenFill xmlns:a14="http://schemas.microsoft.com/office/drawing/2010/main">
-                <a:solidFill>
-                  <a:srgbClr val="FFFFFF"/>
-                </a:solidFill>
-              </a14:hiddenFill>
-            </a:ext>
-          </a:extLst>
-        </p:spPr>
-      </p:pic>
+            <p:extLst>
+              <p:ext uri="{D42A27DB-BD31-4B8C-83A1-F6EECF244321}">
+                <p14:modId xmlns:p14="http://schemas.microsoft.com/office/powerpoint/2010/main" val="3827656844"/>
+              </p:ext>
+            </p:extLst>
+          </p:nvPr>
+        </p:nvGraphicFramePr>
+        <p:xfrm>
+          <a:off x="1103313" y="2052638"/>
+          <a:ext cx="8947150" cy="4195762"/>
+        </p:xfrm>
+        <a:graphic>
+          <a:graphicData uri="http://schemas.openxmlformats.org/drawingml/2006/chart">
+            <c:chart xmlns:c="http://schemas.openxmlformats.org/drawingml/2006/chart" xmlns:r="http://schemas.openxmlformats.org/officeDocument/2006/relationships" r:id="rId2"/>
+          </a:graphicData>
+        </a:graphic>
+      </p:graphicFrame>
     </p:spTree>
     <p:extLst>
       <p:ext uri="{BB962C8B-B14F-4D97-AF65-F5344CB8AC3E}">

</xml_diff>

<commit_message>
Add presentation for Alina and update presentation for Andrew
</commit_message>
<xml_diff>
--- a/2023/Диплом/Андрей Козин/Презентация Андрей.pptx
+++ b/2023/Диплом/Андрей Козин/Презентация Андрей.pptx
@@ -230,6 +230,11 @@
                 </a:outerShdw>
               </a:effectLst>
             </c:spPr>
+            <c:extLst>
+              <c:ext xmlns:c16="http://schemas.microsoft.com/office/drawing/2014/chart" uri="{C3380CC4-5D6E-409C-BE32-E72D297353CC}">
+                <c16:uniqueId val="{00000001-6837-45DA-8471-55C35457C220}"/>
+              </c:ext>
+            </c:extLst>
           </c:dPt>
           <c:dPt>
             <c:idx val="1"/>
@@ -249,6 +254,11 @@
                 </a:outerShdw>
               </a:effectLst>
             </c:spPr>
+            <c:extLst>
+              <c:ext xmlns:c16="http://schemas.microsoft.com/office/drawing/2014/chart" uri="{C3380CC4-5D6E-409C-BE32-E72D297353CC}">
+                <c16:uniqueId val="{00000003-6837-45DA-8471-55C35457C220}"/>
+              </c:ext>
+            </c:extLst>
           </c:dPt>
           <c:dPt>
             <c:idx val="2"/>
@@ -268,6 +278,11 @@
                 </a:outerShdw>
               </a:effectLst>
             </c:spPr>
+            <c:extLst>
+              <c:ext xmlns:c16="http://schemas.microsoft.com/office/drawing/2014/chart" uri="{C3380CC4-5D6E-409C-BE32-E72D297353CC}">
+                <c16:uniqueId val="{00000005-6837-45DA-8471-55C35457C220}"/>
+              </c:ext>
+            </c:extLst>
           </c:dPt>
           <c:dLbls>
             <c:spPr>
@@ -1327,7 +1342,7 @@
           <a:p>
             <a:fld id="{8720104C-3C9D-4B62-9936-5C987D21D7C9}" type="datetimeFigureOut">
               <a:rPr lang="ru-RU" smtClean="0"/>
-              <a:t>30.05.2023</a:t>
+              <a:t>04.06.2023</a:t>
             </a:fld>
             <a:endParaRPr lang="ru-RU"/>
           </a:p>
@@ -1602,7 +1617,7 @@
           <a:p>
             <a:fld id="{8720104C-3C9D-4B62-9936-5C987D21D7C9}" type="datetimeFigureOut">
               <a:rPr lang="ru-RU" smtClean="0"/>
-              <a:t>30.05.2023</a:t>
+              <a:t>04.06.2023</a:t>
             </a:fld>
             <a:endParaRPr lang="ru-RU"/>
           </a:p>
@@ -1796,7 +1811,7 @@
           <a:p>
             <a:fld id="{8720104C-3C9D-4B62-9936-5C987D21D7C9}" type="datetimeFigureOut">
               <a:rPr lang="ru-RU" smtClean="0"/>
-              <a:t>30.05.2023</a:t>
+              <a:t>04.06.2023</a:t>
             </a:fld>
             <a:endParaRPr lang="ru-RU"/>
           </a:p>
@@ -2069,7 +2084,7 @@
           <a:p>
             <a:fld id="{8720104C-3C9D-4B62-9936-5C987D21D7C9}" type="datetimeFigureOut">
               <a:rPr lang="ru-RU" smtClean="0"/>
-              <a:t>30.05.2023</a:t>
+              <a:t>04.06.2023</a:t>
             </a:fld>
             <a:endParaRPr lang="ru-RU"/>
           </a:p>
@@ -2410,7 +2425,7 @@
           <a:p>
             <a:fld id="{8720104C-3C9D-4B62-9936-5C987D21D7C9}" type="datetimeFigureOut">
               <a:rPr lang="ru-RU" smtClean="0"/>
-              <a:t>30.05.2023</a:t>
+              <a:t>04.06.2023</a:t>
             </a:fld>
             <a:endParaRPr lang="ru-RU"/>
           </a:p>
@@ -3033,7 +3048,7 @@
           <a:p>
             <a:fld id="{8720104C-3C9D-4B62-9936-5C987D21D7C9}" type="datetimeFigureOut">
               <a:rPr lang="ru-RU" smtClean="0"/>
-              <a:t>30.05.2023</a:t>
+              <a:t>04.06.2023</a:t>
             </a:fld>
             <a:endParaRPr lang="ru-RU"/>
           </a:p>
@@ -3893,7 +3908,7 @@
           <a:p>
             <a:fld id="{8720104C-3C9D-4B62-9936-5C987D21D7C9}" type="datetimeFigureOut">
               <a:rPr lang="ru-RU" smtClean="0"/>
-              <a:t>30.05.2023</a:t>
+              <a:t>04.06.2023</a:t>
             </a:fld>
             <a:endParaRPr lang="ru-RU"/>
           </a:p>
@@ -4063,7 +4078,7 @@
           <a:p>
             <a:fld id="{8720104C-3C9D-4B62-9936-5C987D21D7C9}" type="datetimeFigureOut">
               <a:rPr lang="ru-RU" smtClean="0"/>
-              <a:t>30.05.2023</a:t>
+              <a:t>04.06.2023</a:t>
             </a:fld>
             <a:endParaRPr lang="ru-RU"/>
           </a:p>
@@ -4243,7 +4258,7 @@
           <a:p>
             <a:fld id="{8720104C-3C9D-4B62-9936-5C987D21D7C9}" type="datetimeFigureOut">
               <a:rPr lang="ru-RU" smtClean="0"/>
-              <a:t>30.05.2023</a:t>
+              <a:t>04.06.2023</a:t>
             </a:fld>
             <a:endParaRPr lang="ru-RU"/>
           </a:p>
@@ -4413,7 +4428,7 @@
           <a:p>
             <a:fld id="{8720104C-3C9D-4B62-9936-5C987D21D7C9}" type="datetimeFigureOut">
               <a:rPr lang="ru-RU" smtClean="0"/>
-              <a:t>30.05.2023</a:t>
+              <a:t>04.06.2023</a:t>
             </a:fld>
             <a:endParaRPr lang="ru-RU"/>
           </a:p>
@@ -4660,7 +4675,7 @@
           <a:p>
             <a:fld id="{8720104C-3C9D-4B62-9936-5C987D21D7C9}" type="datetimeFigureOut">
               <a:rPr lang="ru-RU" smtClean="0"/>
-              <a:t>30.05.2023</a:t>
+              <a:t>04.06.2023</a:t>
             </a:fld>
             <a:endParaRPr lang="ru-RU"/>
           </a:p>
@@ -4952,7 +4967,7 @@
           <a:p>
             <a:fld id="{8720104C-3C9D-4B62-9936-5C987D21D7C9}" type="datetimeFigureOut">
               <a:rPr lang="ru-RU" smtClean="0"/>
-              <a:t>30.05.2023</a:t>
+              <a:t>04.06.2023</a:t>
             </a:fld>
             <a:endParaRPr lang="ru-RU"/>
           </a:p>
@@ -5396,7 +5411,7 @@
           <a:p>
             <a:fld id="{8720104C-3C9D-4B62-9936-5C987D21D7C9}" type="datetimeFigureOut">
               <a:rPr lang="ru-RU" smtClean="0"/>
-              <a:t>30.05.2023</a:t>
+              <a:t>04.06.2023</a:t>
             </a:fld>
             <a:endParaRPr lang="ru-RU"/>
           </a:p>
@@ -5514,7 +5529,7 @@
           <a:p>
             <a:fld id="{8720104C-3C9D-4B62-9936-5C987D21D7C9}" type="datetimeFigureOut">
               <a:rPr lang="ru-RU" smtClean="0"/>
-              <a:t>30.05.2023</a:t>
+              <a:t>04.06.2023</a:t>
             </a:fld>
             <a:endParaRPr lang="ru-RU"/>
           </a:p>
@@ -5609,7 +5624,7 @@
           <a:p>
             <a:fld id="{8720104C-3C9D-4B62-9936-5C987D21D7C9}" type="datetimeFigureOut">
               <a:rPr lang="ru-RU" smtClean="0"/>
-              <a:t>30.05.2023</a:t>
+              <a:t>04.06.2023</a:t>
             </a:fld>
             <a:endParaRPr lang="ru-RU"/>
           </a:p>
@@ -5888,7 +5903,7 @@
           <a:p>
             <a:fld id="{8720104C-3C9D-4B62-9936-5C987D21D7C9}" type="datetimeFigureOut">
               <a:rPr lang="ru-RU" smtClean="0"/>
-              <a:t>30.05.2023</a:t>
+              <a:t>04.06.2023</a:t>
             </a:fld>
             <a:endParaRPr lang="ru-RU"/>
           </a:p>
@@ -6163,7 +6178,7 @@
           <a:p>
             <a:fld id="{8720104C-3C9D-4B62-9936-5C987D21D7C9}" type="datetimeFigureOut">
               <a:rPr lang="ru-RU" smtClean="0"/>
-              <a:t>30.05.2023</a:t>
+              <a:t>04.06.2023</a:t>
             </a:fld>
             <a:endParaRPr lang="ru-RU"/>
           </a:p>
@@ -6592,7 +6607,7 @@
           <a:p>
             <a:fld id="{8720104C-3C9D-4B62-9936-5C987D21D7C9}" type="datetimeFigureOut">
               <a:rPr lang="ru-RU" smtClean="0"/>
-              <a:t>30.05.2023</a:t>
+              <a:t>04.06.2023</a:t>
             </a:fld>
             <a:endParaRPr lang="ru-RU"/>
           </a:p>
@@ -8058,207 +8073,88 @@
           </a:p>
         </p:txBody>
       </p:sp>
-      <p:graphicFrame>
-        <p:nvGraphicFramePr>
-          <p:cNvPr id="5" name="Таблица 4"/>
-          <p:cNvGraphicFramePr>
-            <a:graphicFrameLocks noGrp="1"/>
-          </p:cNvGraphicFramePr>
-          <p:nvPr>
-            <p:extLst>
-              <p:ext uri="{D42A27DB-BD31-4B8C-83A1-F6EECF244321}">
-                <p14:modId xmlns:p14="http://schemas.microsoft.com/office/powerpoint/2010/main" val="1592092921"/>
-              </p:ext>
-            </p:extLst>
-          </p:nvPr>
-        </p:nvGraphicFramePr>
-        <p:xfrm>
-          <a:off x="1260764" y="1620981"/>
-          <a:ext cx="10072254" cy="4655127"/>
-        </p:xfrm>
-        <a:graphic>
-          <a:graphicData uri="http://schemas.openxmlformats.org/drawingml/2006/table">
-            <a:tbl>
-              <a:tblPr bandRow="1">
-                <a:tableStyleId>{5C22544A-7EE6-4342-B048-85BDC9FD1C3A}</a:tableStyleId>
-              </a:tblPr>
-              <a:tblGrid>
-                <a:gridCol w="7093527">
-                  <a:extLst>
-                    <a:ext uri="{9D8B030D-6E8A-4147-A177-3AD203B41FA5}">
-                      <a16:colId xmlns:a16="http://schemas.microsoft.com/office/drawing/2014/main" val="33841265"/>
-                    </a:ext>
-                  </a:extLst>
-                </a:gridCol>
-                <a:gridCol w="2978727">
-                  <a:extLst>
-                    <a:ext uri="{9D8B030D-6E8A-4147-A177-3AD203B41FA5}">
-                      <a16:colId xmlns:a16="http://schemas.microsoft.com/office/drawing/2014/main" val="1625311254"/>
-                    </a:ext>
-                  </a:extLst>
-                </a:gridCol>
-              </a:tblGrid>
-              <a:tr h="982275">
-                <a:tc>
-                  <a:txBody>
-                    <a:bodyPr/>
-                    <a:lstStyle/>
-                    <a:p>
-                      <a:r>
-                        <a:rPr lang="ru-RU" sz="4000" kern="1200" dirty="0" smtClean="0">
-                          <a:solidFill>
-                            <a:schemeClr val="dk1"/>
-                          </a:solidFill>
-                          <a:effectLst/>
-                          <a:latin typeface="+mn-lt"/>
-                          <a:ea typeface="+mn-ea"/>
-                          <a:cs typeface="+mn-cs"/>
-                        </a:rPr>
-                        <a:t>Площадь окон</a:t>
-                      </a:r>
-                      <a:endParaRPr lang="ru-RU" sz="4000" dirty="0"/>
-                    </a:p>
-                  </a:txBody>
-                  <a:tcPr/>
-                </a:tc>
-                <a:tc>
-                  <a:txBody>
-                    <a:bodyPr/>
-                    <a:lstStyle/>
-                    <a:p>
-                      <a:r>
-                        <a:rPr lang="ru-RU" sz="4000" kern="1200" dirty="0" smtClean="0">
-                          <a:solidFill>
-                            <a:schemeClr val="dk1"/>
-                          </a:solidFill>
-                          <a:effectLst/>
-                          <a:latin typeface="+mn-lt"/>
-                          <a:ea typeface="+mn-ea"/>
-                          <a:cs typeface="+mn-cs"/>
-                        </a:rPr>
-                        <a:t>18,81 м</a:t>
-                      </a:r>
-                      <a:r>
-                        <a:rPr lang="ru-RU" sz="4000" kern="1200" baseline="30000" dirty="0" smtClean="0">
-                          <a:solidFill>
-                            <a:schemeClr val="dk1"/>
-                          </a:solidFill>
-                          <a:effectLst/>
-                          <a:latin typeface="+mn-lt"/>
-                          <a:ea typeface="+mn-ea"/>
-                          <a:cs typeface="+mn-cs"/>
-                        </a:rPr>
-                        <a:t>2</a:t>
-                      </a:r>
-                      <a:endParaRPr lang="ru-RU" sz="4000" dirty="0"/>
-                    </a:p>
-                  </a:txBody>
-                  <a:tcPr/>
-                </a:tc>
-                <a:extLst>
-                  <a:ext uri="{0D108BD9-81ED-4DB2-BD59-A6C34878D82A}">
-                    <a16:rowId xmlns:a16="http://schemas.microsoft.com/office/drawing/2014/main" val="48099438"/>
-                  </a:ext>
-                </a:extLst>
-              </a:tr>
-              <a:tr h="1836426">
-                <a:tc>
-                  <a:txBody>
-                    <a:bodyPr/>
-                    <a:lstStyle/>
-                    <a:p>
-                      <a:r>
-                        <a:rPr lang="ru-RU" sz="4000" kern="1200" dirty="0" smtClean="0">
-                          <a:solidFill>
-                            <a:schemeClr val="dk1"/>
-                          </a:solidFill>
-                          <a:effectLst/>
-                          <a:latin typeface="+mn-lt"/>
-                          <a:ea typeface="+mn-ea"/>
-                          <a:cs typeface="+mn-cs"/>
-                        </a:rPr>
-                        <a:t>Индекс помещения</a:t>
-                      </a:r>
-                      <a:endParaRPr lang="ru-RU" sz="4000" dirty="0"/>
-                    </a:p>
-                  </a:txBody>
-                  <a:tcPr/>
-                </a:tc>
-                <a:tc>
-                  <a:txBody>
-                    <a:bodyPr/>
-                    <a:lstStyle/>
-                    <a:p>
-                      <a:r>
-                        <a:rPr lang="ru-RU" sz="4000" dirty="0" smtClean="0"/>
-                        <a:t>1,375</a:t>
-                      </a:r>
-                      <a:endParaRPr lang="ru-RU" sz="4000" dirty="0"/>
-                    </a:p>
-                  </a:txBody>
-                  <a:tcPr/>
-                </a:tc>
-                <a:extLst>
-                  <a:ext uri="{0D108BD9-81ED-4DB2-BD59-A6C34878D82A}">
-                    <a16:rowId xmlns:a16="http://schemas.microsoft.com/office/drawing/2014/main" val="2965245775"/>
-                  </a:ext>
-                </a:extLst>
-              </a:tr>
-              <a:tr h="1836426">
-                <a:tc>
-                  <a:txBody>
-                    <a:bodyPr/>
-                    <a:lstStyle/>
-                    <a:p>
-                      <a:r>
-                        <a:rPr lang="ru-RU" sz="4000" kern="1200" dirty="0" smtClean="0">
-                          <a:solidFill>
-                            <a:schemeClr val="dk1"/>
-                          </a:solidFill>
-                          <a:effectLst/>
-                          <a:latin typeface="+mn-lt"/>
-                          <a:ea typeface="+mn-ea"/>
-                          <a:cs typeface="+mn-cs"/>
-                        </a:rPr>
-                        <a:t>Количество светильников</a:t>
-                      </a:r>
-                      <a:endParaRPr lang="ru-RU" sz="4000" dirty="0"/>
-                    </a:p>
-                  </a:txBody>
-                  <a:tcPr/>
-                </a:tc>
-                <a:tc>
-                  <a:txBody>
-                    <a:bodyPr/>
-                    <a:lstStyle/>
-                    <a:p>
-                      <a:r>
-                        <a:rPr lang="ru-RU" sz="4000" kern="1200" dirty="0" smtClean="0">
-                          <a:solidFill>
-                            <a:schemeClr val="dk1"/>
-                          </a:solidFill>
-                          <a:effectLst/>
-                          <a:latin typeface="+mn-lt"/>
-                          <a:ea typeface="+mn-ea"/>
-                          <a:cs typeface="+mn-cs"/>
-                        </a:rPr>
-                        <a:t>40 шт.</a:t>
-                      </a:r>
-                      <a:endParaRPr lang="ru-RU" sz="4000" dirty="0"/>
-                    </a:p>
-                  </a:txBody>
-                  <a:tcPr/>
-                </a:tc>
-                <a:extLst>
-                  <a:ext uri="{0D108BD9-81ED-4DB2-BD59-A6C34878D82A}">
-                    <a16:rowId xmlns:a16="http://schemas.microsoft.com/office/drawing/2014/main" val="3381579036"/>
-                  </a:ext>
-                </a:extLst>
-              </a:tr>
-            </a:tbl>
-          </a:graphicData>
-        </a:graphic>
-      </p:graphicFrame>
+      <p:pic>
+        <p:nvPicPr>
+          <p:cNvPr id="1028" name="Picture 4" descr="Классификация взрывоопасных сред, выбор оборудования, стандарт ATEX |  АЛЬПИНДУСТРИЯ-ПРО"/>
+          <p:cNvPicPr>
+            <a:picLocks noChangeAspect="1" noChangeArrowheads="1"/>
+          </p:cNvPicPr>
+          <p:nvPr/>
+        </p:nvPicPr>
+        <p:blipFill>
+          <a:blip r:embed="rId2">
+            <a:extLst>
+              <a:ext uri="{28A0092B-C50C-407E-A947-70E740481C1C}">
+                <a14:useLocalDpi xmlns:a14="http://schemas.microsoft.com/office/drawing/2010/main" val="0"/>
+              </a:ext>
+            </a:extLst>
+          </a:blip>
+          <a:srcRect/>
+          <a:stretch>
+            <a:fillRect/>
+          </a:stretch>
+        </p:blipFill>
+        <p:spPr bwMode="auto">
+          <a:xfrm>
+            <a:off x="1513321" y="2109354"/>
+            <a:ext cx="3488170" cy="3488170"/>
+          </a:xfrm>
+          <a:prstGeom prst="rect">
+            <a:avLst/>
+          </a:prstGeom>
+          <a:noFill/>
+          <a:extLst>
+            <a:ext uri="{909E8E84-426E-40DD-AFC4-6F175D3DCCD1}">
+              <a14:hiddenFill xmlns:a14="http://schemas.microsoft.com/office/drawing/2010/main">
+                <a:solidFill>
+                  <a:srgbClr val="FFFFFF"/>
+                </a:solidFill>
+              </a14:hiddenFill>
+            </a:ext>
+          </a:extLst>
+        </p:spPr>
+      </p:pic>
+      <p:pic>
+        <p:nvPicPr>
+          <p:cNvPr id="1030" name="Picture 6" descr="Знак 150х150мм &quot;Пожароопасность&quot; (10шт)"/>
+          <p:cNvPicPr>
+            <a:picLocks noChangeAspect="1" noChangeArrowheads="1"/>
+          </p:cNvPicPr>
+          <p:nvPr/>
+        </p:nvPicPr>
+        <p:blipFill>
+          <a:blip r:embed="rId3">
+            <a:extLst>
+              <a:ext uri="{28A0092B-C50C-407E-A947-70E740481C1C}">
+                <a14:useLocalDpi xmlns:a14="http://schemas.microsoft.com/office/drawing/2010/main" val="0"/>
+              </a:ext>
+            </a:extLst>
+          </a:blip>
+          <a:srcRect/>
+          <a:stretch>
+            <a:fillRect/>
+          </a:stretch>
+        </p:blipFill>
+        <p:spPr bwMode="auto">
+          <a:xfrm>
+            <a:off x="6847717" y="2109354"/>
+            <a:ext cx="3764865" cy="3488170"/>
+          </a:xfrm>
+          <a:prstGeom prst="rect">
+            <a:avLst/>
+          </a:prstGeom>
+          <a:noFill/>
+          <a:extLst>
+            <a:ext uri="{909E8E84-426E-40DD-AFC4-6F175D3DCCD1}">
+              <a14:hiddenFill xmlns:a14="http://schemas.microsoft.com/office/drawing/2010/main">
+                <a:solidFill>
+                  <a:srgbClr val="FFFFFF"/>
+                </a:solidFill>
+              </a14:hiddenFill>
+            </a:ext>
+          </a:extLst>
+        </p:spPr>
+      </p:pic>
     </p:spTree>
     <p:extLst>
       <p:ext uri="{BB962C8B-B14F-4D97-AF65-F5344CB8AC3E}">

</xml_diff>